<commit_message>
Put generated-files in angular project
</commit_message>
<xml_diff>
--- a/planning-and-logs/Xtext&Xtend.pptx
+++ b/planning-and-logs/Xtext&Xtend.pptx
@@ -7,6 +7,12 @@
   <p:sldIdLst>
     <p:sldId id="256" r:id="rId2"/>
     <p:sldId id="257" r:id="rId3"/>
+    <p:sldId id="258" r:id="rId4"/>
+    <p:sldId id="259" r:id="rId5"/>
+    <p:sldId id="260" r:id="rId6"/>
+    <p:sldId id="261" r:id="rId7"/>
+    <p:sldId id="262" r:id="rId8"/>
+    <p:sldId id="263" r:id="rId9"/>
   </p:sldIdLst>
   <p:sldSz cx="12192000" cy="6858000"/>
   <p:notesSz cx="6858000" cy="9144000"/>
@@ -105,6 +111,35 @@
       </a:defRPr>
     </a:lvl9pPr>
   </p:defaultTextStyle>
+  <p:extLst>
+    <p:ext uri="{521415D9-36F7-43E2-AB2F-B90AF26B5E84}">
+      <p14:sectionLst xmlns:p14="http://schemas.microsoft.com/office/powerpoint/2010/main">
+        <p14:section name="默认节" id="{CD02532D-B5E8-4F75-9B3A-46C344089D3F}">
+          <p14:sldIdLst>
+            <p14:sldId id="256"/>
+            <p14:sldId id="257"/>
+          </p14:sldIdLst>
+        </p14:section>
+        <p14:section name="Files Paths" id="{F33F8E00-7EB1-48E1-B0B6-65F6CB1DB389}">
+          <p14:sldIdLst>
+            <p14:sldId id="258"/>
+            <p14:sldId id="259"/>
+            <p14:sldId id="260"/>
+          </p14:sldIdLst>
+        </p14:section>
+        <p14:section name="Put all code in a empty angular proejct" id="{3D58BE20-D2D9-4B53-AB84-7C7DF4518955}">
+          <p14:sldIdLst>
+            <p14:sldId id="261"/>
+            <p14:sldId id="262"/>
+            <p14:sldId id="263"/>
+          </p14:sldIdLst>
+        </p14:section>
+      </p14:sectionLst>
+    </p:ext>
+    <p:ext uri="{EFAFB233-063F-42B5-8137-9DF3F51BA10A}">
+      <p15:sldGuideLst xmlns:p15="http://schemas.microsoft.com/office/powerpoint/2012/main"/>
+    </p:ext>
+  </p:extLst>
 </p:presentation>
 </file>
 
@@ -255,7 +290,7 @@
           <a:p>
             <a:fld id="{298D810B-F3C2-4B26-A7B0-5F7F8CF6EAE6}" type="datetimeFigureOut">
               <a:rPr lang="zh-CN" altLang="en-US" smtClean="0"/>
-              <a:t>2023/4/5</a:t>
+              <a:t>2023/4/11</a:t>
             </a:fld>
             <a:endParaRPr lang="zh-CN" altLang="en-US"/>
           </a:p>
@@ -453,7 +488,7 @@
           <a:p>
             <a:fld id="{298D810B-F3C2-4B26-A7B0-5F7F8CF6EAE6}" type="datetimeFigureOut">
               <a:rPr lang="zh-CN" altLang="en-US" smtClean="0"/>
-              <a:t>2023/4/5</a:t>
+              <a:t>2023/4/11</a:t>
             </a:fld>
             <a:endParaRPr lang="zh-CN" altLang="en-US"/>
           </a:p>
@@ -661,7 +696,7 @@
           <a:p>
             <a:fld id="{298D810B-F3C2-4B26-A7B0-5F7F8CF6EAE6}" type="datetimeFigureOut">
               <a:rPr lang="zh-CN" altLang="en-US" smtClean="0"/>
-              <a:t>2023/4/5</a:t>
+              <a:t>2023/4/11</a:t>
             </a:fld>
             <a:endParaRPr lang="zh-CN" altLang="en-US"/>
           </a:p>
@@ -859,7 +894,7 @@
           <a:p>
             <a:fld id="{298D810B-F3C2-4B26-A7B0-5F7F8CF6EAE6}" type="datetimeFigureOut">
               <a:rPr lang="zh-CN" altLang="en-US" smtClean="0"/>
-              <a:t>2023/4/5</a:t>
+              <a:t>2023/4/11</a:t>
             </a:fld>
             <a:endParaRPr lang="zh-CN" altLang="en-US"/>
           </a:p>
@@ -1134,7 +1169,7 @@
           <a:p>
             <a:fld id="{298D810B-F3C2-4B26-A7B0-5F7F8CF6EAE6}" type="datetimeFigureOut">
               <a:rPr lang="zh-CN" altLang="en-US" smtClean="0"/>
-              <a:t>2023/4/5</a:t>
+              <a:t>2023/4/11</a:t>
             </a:fld>
             <a:endParaRPr lang="zh-CN" altLang="en-US"/>
           </a:p>
@@ -1399,7 +1434,7 @@
           <a:p>
             <a:fld id="{298D810B-F3C2-4B26-A7B0-5F7F8CF6EAE6}" type="datetimeFigureOut">
               <a:rPr lang="zh-CN" altLang="en-US" smtClean="0"/>
-              <a:t>2023/4/5</a:t>
+              <a:t>2023/4/11</a:t>
             </a:fld>
             <a:endParaRPr lang="zh-CN" altLang="en-US"/>
           </a:p>
@@ -1811,7 +1846,7 @@
           <a:p>
             <a:fld id="{298D810B-F3C2-4B26-A7B0-5F7F8CF6EAE6}" type="datetimeFigureOut">
               <a:rPr lang="zh-CN" altLang="en-US" smtClean="0"/>
-              <a:t>2023/4/5</a:t>
+              <a:t>2023/4/11</a:t>
             </a:fld>
             <a:endParaRPr lang="zh-CN" altLang="en-US"/>
           </a:p>
@@ -1952,7 +1987,7 @@
           <a:p>
             <a:fld id="{298D810B-F3C2-4B26-A7B0-5F7F8CF6EAE6}" type="datetimeFigureOut">
               <a:rPr lang="zh-CN" altLang="en-US" smtClean="0"/>
-              <a:t>2023/4/5</a:t>
+              <a:t>2023/4/11</a:t>
             </a:fld>
             <a:endParaRPr lang="zh-CN" altLang="en-US"/>
           </a:p>
@@ -2065,7 +2100,7 @@
           <a:p>
             <a:fld id="{298D810B-F3C2-4B26-A7B0-5F7F8CF6EAE6}" type="datetimeFigureOut">
               <a:rPr lang="zh-CN" altLang="en-US" smtClean="0"/>
-              <a:t>2023/4/5</a:t>
+              <a:t>2023/4/11</a:t>
             </a:fld>
             <a:endParaRPr lang="zh-CN" altLang="en-US"/>
           </a:p>
@@ -2376,7 +2411,7 @@
           <a:p>
             <a:fld id="{298D810B-F3C2-4B26-A7B0-5F7F8CF6EAE6}" type="datetimeFigureOut">
               <a:rPr lang="zh-CN" altLang="en-US" smtClean="0"/>
-              <a:t>2023/4/5</a:t>
+              <a:t>2023/4/11</a:t>
             </a:fld>
             <a:endParaRPr lang="zh-CN" altLang="en-US"/>
           </a:p>
@@ -2664,7 +2699,7 @@
           <a:p>
             <a:fld id="{298D810B-F3C2-4B26-A7B0-5F7F8CF6EAE6}" type="datetimeFigureOut">
               <a:rPr lang="zh-CN" altLang="en-US" smtClean="0"/>
-              <a:t>2023/4/5</a:t>
+              <a:t>2023/4/11</a:t>
             </a:fld>
             <a:endParaRPr lang="zh-CN" altLang="en-US"/>
           </a:p>
@@ -2905,7 +2940,7 @@
           <a:p>
             <a:fld id="{298D810B-F3C2-4B26-A7B0-5F7F8CF6EAE6}" type="datetimeFigureOut">
               <a:rPr lang="zh-CN" altLang="en-US" smtClean="0"/>
-              <a:t>2023/4/5</a:t>
+              <a:t>2023/4/11</a:t>
             </a:fld>
             <a:endParaRPr lang="zh-CN" altLang="en-US"/>
           </a:p>
@@ -3679,6 +3714,1270 @@
 </p:sld>
 </file>
 
+<file path=ppt/slides/slide3.xml><?xml version="1.0" encoding="utf-8"?>
+<p:sld xmlns:a="http://schemas.openxmlformats.org/drawingml/2006/main" xmlns:r="http://schemas.openxmlformats.org/officeDocument/2006/relationships" xmlns:p="http://schemas.openxmlformats.org/presentationml/2006/main">
+  <p:cSld>
+    <p:spTree>
+      <p:nvGrpSpPr>
+        <p:cNvPr id="1" name=""/>
+        <p:cNvGrpSpPr/>
+        <p:nvPr/>
+      </p:nvGrpSpPr>
+      <p:grpSpPr>
+        <a:xfrm>
+          <a:off x="0" y="0"/>
+          <a:ext cx="0" cy="0"/>
+          <a:chOff x="0" y="0"/>
+          <a:chExt cx="0" cy="0"/>
+        </a:xfrm>
+      </p:grpSpPr>
+      <p:sp>
+        <p:nvSpPr>
+          <p:cNvPr id="2" name="标题 1">
+            <a:extLst>
+              <a:ext uri="{FF2B5EF4-FFF2-40B4-BE49-F238E27FC236}">
+                <a16:creationId xmlns:a16="http://schemas.microsoft.com/office/drawing/2014/main" id="{43C945E1-A964-19C4-D033-75916FE3D68A}"/>
+              </a:ext>
+            </a:extLst>
+          </p:cNvPr>
+          <p:cNvSpPr>
+            <a:spLocks noGrp="1"/>
+          </p:cNvSpPr>
+          <p:nvPr>
+            <p:ph type="title"/>
+          </p:nvPr>
+        </p:nvSpPr>
+        <p:spPr/>
+        <p:txBody>
+          <a:bodyPr/>
+          <a:lstStyle/>
+          <a:p>
+            <a:r>
+              <a:rPr lang="es-ES" altLang="zh-CN" dirty="0" err="1"/>
+              <a:t>src</a:t>
+            </a:r>
+            <a:r>
+              <a:rPr lang="en-US" altLang="zh-CN" dirty="0"/>
+              <a:t>-gen relative path</a:t>
+            </a:r>
+            <a:endParaRPr lang="zh-CN" altLang="en-US" dirty="0"/>
+          </a:p>
+        </p:txBody>
+      </p:sp>
+      <p:pic>
+        <p:nvPicPr>
+          <p:cNvPr id="11" name="图片 10">
+            <a:extLst>
+              <a:ext uri="{FF2B5EF4-FFF2-40B4-BE49-F238E27FC236}">
+                <a16:creationId xmlns:a16="http://schemas.microsoft.com/office/drawing/2014/main" id="{BCC4D470-B871-46B6-2260-71F3B07C8FEF}"/>
+              </a:ext>
+            </a:extLst>
+          </p:cNvPr>
+          <p:cNvPicPr>
+            <a:picLocks noChangeAspect="1"/>
+          </p:cNvPicPr>
+          <p:nvPr/>
+        </p:nvPicPr>
+        <p:blipFill>
+          <a:blip r:embed="rId2"/>
+          <a:stretch>
+            <a:fillRect/>
+          </a:stretch>
+        </p:blipFill>
+        <p:spPr>
+          <a:xfrm>
+            <a:off x="4743450" y="6203121"/>
+            <a:ext cx="2705100" cy="238125"/>
+          </a:xfrm>
+          <a:prstGeom prst="rect">
+            <a:avLst/>
+          </a:prstGeom>
+        </p:spPr>
+      </p:pic>
+      <p:pic>
+        <p:nvPicPr>
+          <p:cNvPr id="13" name="图片 12">
+            <a:extLst>
+              <a:ext uri="{FF2B5EF4-FFF2-40B4-BE49-F238E27FC236}">
+                <a16:creationId xmlns:a16="http://schemas.microsoft.com/office/drawing/2014/main" id="{1AFD1557-A828-433B-74C2-4CF881863F00}"/>
+              </a:ext>
+            </a:extLst>
+          </p:cNvPr>
+          <p:cNvPicPr>
+            <a:picLocks noChangeAspect="1"/>
+          </p:cNvPicPr>
+          <p:nvPr/>
+        </p:nvPicPr>
+        <p:blipFill>
+          <a:blip r:embed="rId3"/>
+          <a:stretch>
+            <a:fillRect/>
+          </a:stretch>
+        </p:blipFill>
+        <p:spPr>
+          <a:xfrm>
+            <a:off x="7649697" y="244505"/>
+            <a:ext cx="4277310" cy="2892366"/>
+          </a:xfrm>
+          <a:prstGeom prst="rect">
+            <a:avLst/>
+          </a:prstGeom>
+        </p:spPr>
+      </p:pic>
+      <p:pic>
+        <p:nvPicPr>
+          <p:cNvPr id="15" name="图片 14">
+            <a:extLst>
+              <a:ext uri="{FF2B5EF4-FFF2-40B4-BE49-F238E27FC236}">
+                <a16:creationId xmlns:a16="http://schemas.microsoft.com/office/drawing/2014/main" id="{515CD67B-CB84-6CB0-0EA8-BA61487ECEC0}"/>
+              </a:ext>
+            </a:extLst>
+          </p:cNvPr>
+          <p:cNvPicPr>
+            <a:picLocks noChangeAspect="1"/>
+          </p:cNvPicPr>
+          <p:nvPr/>
+        </p:nvPicPr>
+        <p:blipFill>
+          <a:blip r:embed="rId4"/>
+          <a:stretch>
+            <a:fillRect/>
+          </a:stretch>
+        </p:blipFill>
+        <p:spPr>
+          <a:xfrm>
+            <a:off x="1329519" y="2486239"/>
+            <a:ext cx="9033681" cy="3190874"/>
+          </a:xfrm>
+          <a:prstGeom prst="rect">
+            <a:avLst/>
+          </a:prstGeom>
+        </p:spPr>
+      </p:pic>
+      <p:sp>
+        <p:nvSpPr>
+          <p:cNvPr id="16" name="文本框 15">
+            <a:extLst>
+              <a:ext uri="{FF2B5EF4-FFF2-40B4-BE49-F238E27FC236}">
+                <a16:creationId xmlns:a16="http://schemas.microsoft.com/office/drawing/2014/main" id="{F486731A-67F9-324F-3512-FBA76B65E573}"/>
+              </a:ext>
+            </a:extLst>
+          </p:cNvPr>
+          <p:cNvSpPr txBox="1"/>
+          <p:nvPr/>
+        </p:nvSpPr>
+        <p:spPr>
+          <a:xfrm>
+            <a:off x="1023025" y="2116907"/>
+            <a:ext cx="306494" cy="369332"/>
+          </a:xfrm>
+          <a:prstGeom prst="rect">
+            <a:avLst/>
+          </a:prstGeom>
+          <a:noFill/>
+        </p:spPr>
+        <p:txBody>
+          <a:bodyPr wrap="none" rtlCol="0">
+            <a:spAutoFit/>
+          </a:bodyPr>
+          <a:lstStyle/>
+          <a:p>
+            <a:r>
+              <a:rPr lang="en-US" altLang="zh-CN" dirty="0"/>
+              <a:t>1</a:t>
+            </a:r>
+            <a:endParaRPr lang="zh-CN" altLang="en-US" dirty="0"/>
+          </a:p>
+        </p:txBody>
+      </p:sp>
+      <p:sp>
+        <p:nvSpPr>
+          <p:cNvPr id="17" name="文本框 16">
+            <a:extLst>
+              <a:ext uri="{FF2B5EF4-FFF2-40B4-BE49-F238E27FC236}">
+                <a16:creationId xmlns:a16="http://schemas.microsoft.com/office/drawing/2014/main" id="{4BB443F1-304A-5B05-0868-9D3222FDE66E}"/>
+              </a:ext>
+            </a:extLst>
+          </p:cNvPr>
+          <p:cNvSpPr txBox="1"/>
+          <p:nvPr/>
+        </p:nvSpPr>
+        <p:spPr>
+          <a:xfrm>
+            <a:off x="7343203" y="1538993"/>
+            <a:ext cx="306494" cy="369332"/>
+          </a:xfrm>
+          <a:prstGeom prst="rect">
+            <a:avLst/>
+          </a:prstGeom>
+          <a:noFill/>
+        </p:spPr>
+        <p:txBody>
+          <a:bodyPr wrap="none" rtlCol="0">
+            <a:spAutoFit/>
+          </a:bodyPr>
+          <a:lstStyle/>
+          <a:p>
+            <a:r>
+              <a:rPr lang="en-US" altLang="zh-CN" dirty="0"/>
+              <a:t>2</a:t>
+            </a:r>
+            <a:endParaRPr lang="zh-CN" altLang="en-US" dirty="0"/>
+          </a:p>
+        </p:txBody>
+      </p:sp>
+      <p:sp>
+        <p:nvSpPr>
+          <p:cNvPr id="18" name="文本框 17">
+            <a:extLst>
+              <a:ext uri="{FF2B5EF4-FFF2-40B4-BE49-F238E27FC236}">
+                <a16:creationId xmlns:a16="http://schemas.microsoft.com/office/drawing/2014/main" id="{F4E92D2E-337E-05C0-A750-D57226170D35}"/>
+              </a:ext>
+            </a:extLst>
+          </p:cNvPr>
+          <p:cNvSpPr txBox="1"/>
+          <p:nvPr/>
+        </p:nvSpPr>
+        <p:spPr>
+          <a:xfrm>
+            <a:off x="4436956" y="6137517"/>
+            <a:ext cx="306494" cy="369332"/>
+          </a:xfrm>
+          <a:prstGeom prst="rect">
+            <a:avLst/>
+          </a:prstGeom>
+          <a:noFill/>
+        </p:spPr>
+        <p:txBody>
+          <a:bodyPr wrap="none" rtlCol="0">
+            <a:spAutoFit/>
+          </a:bodyPr>
+          <a:lstStyle/>
+          <a:p>
+            <a:r>
+              <a:rPr lang="en-US" altLang="zh-CN" dirty="0"/>
+              <a:t>3</a:t>
+            </a:r>
+            <a:endParaRPr lang="zh-CN" altLang="en-US" dirty="0"/>
+          </a:p>
+        </p:txBody>
+      </p:sp>
+    </p:spTree>
+    <p:extLst>
+      <p:ext uri="{BB962C8B-B14F-4D97-AF65-F5344CB8AC3E}">
+        <p14:creationId xmlns:p14="http://schemas.microsoft.com/office/powerpoint/2010/main" val="521096005"/>
+      </p:ext>
+    </p:extLst>
+  </p:cSld>
+  <p:clrMapOvr>
+    <a:masterClrMapping/>
+  </p:clrMapOvr>
+</p:sld>
+</file>
+
+<file path=ppt/slides/slide4.xml><?xml version="1.0" encoding="utf-8"?>
+<p:sld xmlns:a="http://schemas.openxmlformats.org/drawingml/2006/main" xmlns:r="http://schemas.openxmlformats.org/officeDocument/2006/relationships" xmlns:p="http://schemas.openxmlformats.org/presentationml/2006/main">
+  <p:cSld>
+    <p:spTree>
+      <p:nvGrpSpPr>
+        <p:cNvPr id="1" name=""/>
+        <p:cNvGrpSpPr/>
+        <p:nvPr/>
+      </p:nvGrpSpPr>
+      <p:grpSpPr>
+        <a:xfrm>
+          <a:off x="0" y="0"/>
+          <a:ext cx="0" cy="0"/>
+          <a:chOff x="0" y="0"/>
+          <a:chExt cx="0" cy="0"/>
+        </a:xfrm>
+      </p:grpSpPr>
+      <p:sp>
+        <p:nvSpPr>
+          <p:cNvPr id="2" name="标题 1">
+            <a:extLst>
+              <a:ext uri="{FF2B5EF4-FFF2-40B4-BE49-F238E27FC236}">
+                <a16:creationId xmlns:a16="http://schemas.microsoft.com/office/drawing/2014/main" id="{43C945E1-A964-19C4-D033-75916FE3D68A}"/>
+              </a:ext>
+            </a:extLst>
+          </p:cNvPr>
+          <p:cNvSpPr>
+            <a:spLocks noGrp="1"/>
+          </p:cNvSpPr>
+          <p:nvPr>
+            <p:ph type="title"/>
+          </p:nvPr>
+        </p:nvSpPr>
+        <p:spPr/>
+        <p:txBody>
+          <a:bodyPr/>
+          <a:lstStyle/>
+          <a:p>
+            <a:r>
+              <a:rPr lang="es-ES" altLang="zh-CN" dirty="0" err="1"/>
+              <a:t>src</a:t>
+            </a:r>
+            <a:r>
+              <a:rPr lang="en-US" altLang="zh-CN" dirty="0"/>
+              <a:t> relative path</a:t>
+            </a:r>
+            <a:endParaRPr lang="zh-CN" altLang="en-US" dirty="0"/>
+          </a:p>
+        </p:txBody>
+      </p:sp>
+      <p:sp>
+        <p:nvSpPr>
+          <p:cNvPr id="16" name="文本框 15">
+            <a:extLst>
+              <a:ext uri="{FF2B5EF4-FFF2-40B4-BE49-F238E27FC236}">
+                <a16:creationId xmlns:a16="http://schemas.microsoft.com/office/drawing/2014/main" id="{F486731A-67F9-324F-3512-FBA76B65E573}"/>
+              </a:ext>
+            </a:extLst>
+          </p:cNvPr>
+          <p:cNvSpPr txBox="1"/>
+          <p:nvPr/>
+        </p:nvSpPr>
+        <p:spPr>
+          <a:xfrm>
+            <a:off x="1023025" y="2116907"/>
+            <a:ext cx="306494" cy="369332"/>
+          </a:xfrm>
+          <a:prstGeom prst="rect">
+            <a:avLst/>
+          </a:prstGeom>
+          <a:noFill/>
+        </p:spPr>
+        <p:txBody>
+          <a:bodyPr wrap="none" rtlCol="0">
+            <a:spAutoFit/>
+          </a:bodyPr>
+          <a:lstStyle/>
+          <a:p>
+            <a:r>
+              <a:rPr lang="en-US" altLang="zh-CN" dirty="0"/>
+              <a:t>1</a:t>
+            </a:r>
+            <a:endParaRPr lang="zh-CN" altLang="en-US" dirty="0"/>
+          </a:p>
+        </p:txBody>
+      </p:sp>
+      <p:sp>
+        <p:nvSpPr>
+          <p:cNvPr id="17" name="文本框 16">
+            <a:extLst>
+              <a:ext uri="{FF2B5EF4-FFF2-40B4-BE49-F238E27FC236}">
+                <a16:creationId xmlns:a16="http://schemas.microsoft.com/office/drawing/2014/main" id="{4BB443F1-304A-5B05-0868-9D3222FDE66E}"/>
+              </a:ext>
+            </a:extLst>
+          </p:cNvPr>
+          <p:cNvSpPr txBox="1"/>
+          <p:nvPr/>
+        </p:nvSpPr>
+        <p:spPr>
+          <a:xfrm>
+            <a:off x="7343203" y="1538993"/>
+            <a:ext cx="306494" cy="369332"/>
+          </a:xfrm>
+          <a:prstGeom prst="rect">
+            <a:avLst/>
+          </a:prstGeom>
+          <a:noFill/>
+        </p:spPr>
+        <p:txBody>
+          <a:bodyPr wrap="none" rtlCol="0">
+            <a:spAutoFit/>
+          </a:bodyPr>
+          <a:lstStyle/>
+          <a:p>
+            <a:r>
+              <a:rPr lang="en-US" altLang="zh-CN" dirty="0"/>
+              <a:t>2</a:t>
+            </a:r>
+            <a:endParaRPr lang="zh-CN" altLang="en-US" dirty="0"/>
+          </a:p>
+        </p:txBody>
+      </p:sp>
+      <p:sp>
+        <p:nvSpPr>
+          <p:cNvPr id="18" name="文本框 17">
+            <a:extLst>
+              <a:ext uri="{FF2B5EF4-FFF2-40B4-BE49-F238E27FC236}">
+                <a16:creationId xmlns:a16="http://schemas.microsoft.com/office/drawing/2014/main" id="{F4E92D2E-337E-05C0-A750-D57226170D35}"/>
+              </a:ext>
+            </a:extLst>
+          </p:cNvPr>
+          <p:cNvSpPr txBox="1"/>
+          <p:nvPr/>
+        </p:nvSpPr>
+        <p:spPr>
+          <a:xfrm>
+            <a:off x="4436956" y="6137517"/>
+            <a:ext cx="306494" cy="369332"/>
+          </a:xfrm>
+          <a:prstGeom prst="rect">
+            <a:avLst/>
+          </a:prstGeom>
+          <a:noFill/>
+        </p:spPr>
+        <p:txBody>
+          <a:bodyPr wrap="none" rtlCol="0">
+            <a:spAutoFit/>
+          </a:bodyPr>
+          <a:lstStyle/>
+          <a:p>
+            <a:r>
+              <a:rPr lang="en-US" altLang="zh-CN" dirty="0"/>
+              <a:t>3</a:t>
+            </a:r>
+            <a:endParaRPr lang="zh-CN" altLang="en-US" dirty="0"/>
+          </a:p>
+        </p:txBody>
+      </p:sp>
+      <p:pic>
+        <p:nvPicPr>
+          <p:cNvPr id="4" name="图片 3">
+            <a:extLst>
+              <a:ext uri="{FF2B5EF4-FFF2-40B4-BE49-F238E27FC236}">
+                <a16:creationId xmlns:a16="http://schemas.microsoft.com/office/drawing/2014/main" id="{175CE290-84D8-0C6F-0599-346DF737E971}"/>
+              </a:ext>
+            </a:extLst>
+          </p:cNvPr>
+          <p:cNvPicPr>
+            <a:picLocks noChangeAspect="1"/>
+          </p:cNvPicPr>
+          <p:nvPr/>
+        </p:nvPicPr>
+        <p:blipFill>
+          <a:blip r:embed="rId2"/>
+          <a:stretch>
+            <a:fillRect/>
+          </a:stretch>
+        </p:blipFill>
+        <p:spPr>
+          <a:xfrm>
+            <a:off x="1616394" y="2021237"/>
+            <a:ext cx="9839325" cy="2247900"/>
+          </a:xfrm>
+          <a:prstGeom prst="rect">
+            <a:avLst/>
+          </a:prstGeom>
+        </p:spPr>
+      </p:pic>
+      <p:pic>
+        <p:nvPicPr>
+          <p:cNvPr id="6" name="图片 5">
+            <a:extLst>
+              <a:ext uri="{FF2B5EF4-FFF2-40B4-BE49-F238E27FC236}">
+                <a16:creationId xmlns:a16="http://schemas.microsoft.com/office/drawing/2014/main" id="{9692E55C-EBFD-F5D0-771E-DC7E809B2832}"/>
+              </a:ext>
+            </a:extLst>
+          </p:cNvPr>
+          <p:cNvPicPr>
+            <a:picLocks noChangeAspect="1"/>
+          </p:cNvPicPr>
+          <p:nvPr/>
+        </p:nvPicPr>
+        <p:blipFill>
+          <a:blip r:embed="rId3"/>
+          <a:stretch>
+            <a:fillRect/>
+          </a:stretch>
+        </p:blipFill>
+        <p:spPr>
+          <a:xfrm>
+            <a:off x="4809553" y="6212645"/>
+            <a:ext cx="2533650" cy="219075"/>
+          </a:xfrm>
+          <a:prstGeom prst="rect">
+            <a:avLst/>
+          </a:prstGeom>
+        </p:spPr>
+      </p:pic>
+      <p:pic>
+        <p:nvPicPr>
+          <p:cNvPr id="8" name="图片 7">
+            <a:extLst>
+              <a:ext uri="{FF2B5EF4-FFF2-40B4-BE49-F238E27FC236}">
+                <a16:creationId xmlns:a16="http://schemas.microsoft.com/office/drawing/2014/main" id="{C2F971E7-BBCE-86B8-CFEE-CB76F25F0661}"/>
+              </a:ext>
+            </a:extLst>
+          </p:cNvPr>
+          <p:cNvPicPr>
+            <a:picLocks noChangeAspect="1"/>
+          </p:cNvPicPr>
+          <p:nvPr/>
+        </p:nvPicPr>
+        <p:blipFill>
+          <a:blip r:embed="rId4"/>
+          <a:stretch>
+            <a:fillRect/>
+          </a:stretch>
+        </p:blipFill>
+        <p:spPr>
+          <a:xfrm>
+            <a:off x="7649697" y="86571"/>
+            <a:ext cx="4410075" cy="2047875"/>
+          </a:xfrm>
+          <a:prstGeom prst="rect">
+            <a:avLst/>
+          </a:prstGeom>
+        </p:spPr>
+      </p:pic>
+    </p:spTree>
+    <p:extLst>
+      <p:ext uri="{BB962C8B-B14F-4D97-AF65-F5344CB8AC3E}">
+        <p14:creationId xmlns:p14="http://schemas.microsoft.com/office/powerpoint/2010/main" val="1398299489"/>
+      </p:ext>
+    </p:extLst>
+  </p:cSld>
+  <p:clrMapOvr>
+    <a:masterClrMapping/>
+  </p:clrMapOvr>
+</p:sld>
+</file>
+
+<file path=ppt/slides/slide5.xml><?xml version="1.0" encoding="utf-8"?>
+<p:sld xmlns:a="http://schemas.openxmlformats.org/drawingml/2006/main" xmlns:r="http://schemas.openxmlformats.org/officeDocument/2006/relationships" xmlns:p="http://schemas.openxmlformats.org/presentationml/2006/main">
+  <p:cSld>
+    <p:spTree>
+      <p:nvGrpSpPr>
+        <p:cNvPr id="1" name=""/>
+        <p:cNvGrpSpPr/>
+        <p:nvPr/>
+      </p:nvGrpSpPr>
+      <p:grpSpPr>
+        <a:xfrm>
+          <a:off x="0" y="0"/>
+          <a:ext cx="0" cy="0"/>
+          <a:chOff x="0" y="0"/>
+          <a:chExt cx="0" cy="0"/>
+        </a:xfrm>
+      </p:grpSpPr>
+      <p:sp>
+        <p:nvSpPr>
+          <p:cNvPr id="2" name="标题 1">
+            <a:extLst>
+              <a:ext uri="{FF2B5EF4-FFF2-40B4-BE49-F238E27FC236}">
+                <a16:creationId xmlns:a16="http://schemas.microsoft.com/office/drawing/2014/main" id="{3C92898D-3A35-D850-4FAD-6468CBFB28AF}"/>
+              </a:ext>
+            </a:extLst>
+          </p:cNvPr>
+          <p:cNvSpPr>
+            <a:spLocks noGrp="1"/>
+          </p:cNvSpPr>
+          <p:nvPr>
+            <p:ph type="title"/>
+          </p:nvPr>
+        </p:nvSpPr>
+        <p:spPr>
+          <a:xfrm>
+            <a:off x="224051" y="37424"/>
+            <a:ext cx="10515600" cy="1325563"/>
+          </a:xfrm>
+        </p:spPr>
+        <p:txBody>
+          <a:bodyPr/>
+          <a:lstStyle/>
+          <a:p>
+            <a:r>
+              <a:rPr lang="en-US" altLang="zh-CN" dirty="0"/>
+              <a:t>Output workspace absolute path</a:t>
+            </a:r>
+            <a:endParaRPr lang="zh-CN" altLang="en-US" dirty="0"/>
+          </a:p>
+        </p:txBody>
+      </p:sp>
+      <p:pic>
+        <p:nvPicPr>
+          <p:cNvPr id="5" name="内容占位符 4">
+            <a:extLst>
+              <a:ext uri="{FF2B5EF4-FFF2-40B4-BE49-F238E27FC236}">
+                <a16:creationId xmlns:a16="http://schemas.microsoft.com/office/drawing/2014/main" id="{463D417F-1849-6738-AF39-3ED676DA8A6D}"/>
+              </a:ext>
+            </a:extLst>
+          </p:cNvPr>
+          <p:cNvPicPr>
+            <a:picLocks noGrp="1" noChangeAspect="1"/>
+          </p:cNvPicPr>
+          <p:nvPr>
+            <p:ph idx="1"/>
+          </p:nvPr>
+        </p:nvPicPr>
+        <p:blipFill>
+          <a:blip r:embed="rId2"/>
+          <a:stretch>
+            <a:fillRect/>
+          </a:stretch>
+        </p:blipFill>
+        <p:spPr>
+          <a:xfrm>
+            <a:off x="701552" y="5995728"/>
+            <a:ext cx="4676775" cy="247650"/>
+          </a:xfrm>
+        </p:spPr>
+      </p:pic>
+      <p:pic>
+        <p:nvPicPr>
+          <p:cNvPr id="7" name="图片 6">
+            <a:extLst>
+              <a:ext uri="{FF2B5EF4-FFF2-40B4-BE49-F238E27FC236}">
+                <a16:creationId xmlns:a16="http://schemas.microsoft.com/office/drawing/2014/main" id="{C86C173F-C48D-F440-1690-96DD87ED50BE}"/>
+              </a:ext>
+            </a:extLst>
+          </p:cNvPr>
+          <p:cNvPicPr>
+            <a:picLocks noChangeAspect="1"/>
+          </p:cNvPicPr>
+          <p:nvPr/>
+        </p:nvPicPr>
+        <p:blipFill>
+          <a:blip r:embed="rId3"/>
+          <a:stretch>
+            <a:fillRect/>
+          </a:stretch>
+        </p:blipFill>
+        <p:spPr>
+          <a:xfrm>
+            <a:off x="606018" y="6226175"/>
+            <a:ext cx="7924800" cy="266700"/>
+          </a:xfrm>
+          <a:prstGeom prst="rect">
+            <a:avLst/>
+          </a:prstGeom>
+        </p:spPr>
+      </p:pic>
+      <p:pic>
+        <p:nvPicPr>
+          <p:cNvPr id="9" name="图片 8">
+            <a:extLst>
+              <a:ext uri="{FF2B5EF4-FFF2-40B4-BE49-F238E27FC236}">
+                <a16:creationId xmlns:a16="http://schemas.microsoft.com/office/drawing/2014/main" id="{5696EBC7-7500-D1AD-CC76-A312931F2E8A}"/>
+              </a:ext>
+            </a:extLst>
+          </p:cNvPr>
+          <p:cNvPicPr>
+            <a:picLocks noChangeAspect="1"/>
+          </p:cNvPicPr>
+          <p:nvPr/>
+        </p:nvPicPr>
+        <p:blipFill>
+          <a:blip r:embed="rId4"/>
+          <a:stretch>
+            <a:fillRect/>
+          </a:stretch>
+        </p:blipFill>
+        <p:spPr>
+          <a:xfrm>
+            <a:off x="590877" y="1778631"/>
+            <a:ext cx="5962650" cy="3638550"/>
+          </a:xfrm>
+          <a:prstGeom prst="rect">
+            <a:avLst/>
+          </a:prstGeom>
+        </p:spPr>
+      </p:pic>
+      <p:sp>
+        <p:nvSpPr>
+          <p:cNvPr id="10" name="文本框 9">
+            <a:extLst>
+              <a:ext uri="{FF2B5EF4-FFF2-40B4-BE49-F238E27FC236}">
+                <a16:creationId xmlns:a16="http://schemas.microsoft.com/office/drawing/2014/main" id="{6FCD103B-28C0-B944-FF21-8D77FCCD3BD5}"/>
+              </a:ext>
+            </a:extLst>
+          </p:cNvPr>
+          <p:cNvSpPr txBox="1"/>
+          <p:nvPr/>
+        </p:nvSpPr>
+        <p:spPr>
+          <a:xfrm>
+            <a:off x="590877" y="1385281"/>
+            <a:ext cx="3815468" cy="369332"/>
+          </a:xfrm>
+          <a:prstGeom prst="rect">
+            <a:avLst/>
+          </a:prstGeom>
+          <a:noFill/>
+        </p:spPr>
+        <p:txBody>
+          <a:bodyPr wrap="none" rtlCol="0">
+            <a:spAutoFit/>
+          </a:bodyPr>
+          <a:lstStyle/>
+          <a:p>
+            <a:r>
+              <a:rPr lang="en-US" altLang="zh-CN" dirty="0"/>
+              <a:t>1 add the plugin to the </a:t>
+            </a:r>
+            <a:r>
+              <a:rPr lang="en-US" altLang="zh-CN" dirty="0" err="1"/>
+              <a:t>xtext</a:t>
+            </a:r>
+            <a:r>
+              <a:rPr lang="en-US" altLang="zh-CN" dirty="0"/>
+              <a:t> project</a:t>
+            </a:r>
+            <a:endParaRPr lang="zh-CN" altLang="en-US" dirty="0"/>
+          </a:p>
+        </p:txBody>
+      </p:sp>
+      <p:sp>
+        <p:nvSpPr>
+          <p:cNvPr id="11" name="文本框 10">
+            <a:extLst>
+              <a:ext uri="{FF2B5EF4-FFF2-40B4-BE49-F238E27FC236}">
+                <a16:creationId xmlns:a16="http://schemas.microsoft.com/office/drawing/2014/main" id="{41249B75-2571-88EA-F53E-97EA820819E1}"/>
+              </a:ext>
+            </a:extLst>
+          </p:cNvPr>
+          <p:cNvSpPr txBox="1"/>
+          <p:nvPr/>
+        </p:nvSpPr>
+        <p:spPr>
+          <a:xfrm>
+            <a:off x="590877" y="5561565"/>
+            <a:ext cx="2545890" cy="369332"/>
+          </a:xfrm>
+          <a:prstGeom prst="rect">
+            <a:avLst/>
+          </a:prstGeom>
+          <a:noFill/>
+        </p:spPr>
+        <p:txBody>
+          <a:bodyPr wrap="none" rtlCol="0">
+            <a:spAutoFit/>
+          </a:bodyPr>
+          <a:lstStyle/>
+          <a:p>
+            <a:r>
+              <a:rPr lang="en-US" altLang="zh-CN" dirty="0"/>
+              <a:t>2 usage in the </a:t>
+            </a:r>
+            <a:r>
+              <a:rPr lang="en-US" altLang="zh-CN" dirty="0" err="1"/>
+              <a:t>xtend</a:t>
+            </a:r>
+            <a:r>
+              <a:rPr lang="en-US" altLang="zh-CN" dirty="0"/>
+              <a:t> file</a:t>
+            </a:r>
+            <a:endParaRPr lang="zh-CN" altLang="en-US" dirty="0"/>
+          </a:p>
+        </p:txBody>
+      </p:sp>
+      <p:sp>
+        <p:nvSpPr>
+          <p:cNvPr id="12" name="文本框 11">
+            <a:extLst>
+              <a:ext uri="{FF2B5EF4-FFF2-40B4-BE49-F238E27FC236}">
+                <a16:creationId xmlns:a16="http://schemas.microsoft.com/office/drawing/2014/main" id="{64031680-1E06-1EFA-6561-FC61C568089D}"/>
+              </a:ext>
+            </a:extLst>
+          </p:cNvPr>
+          <p:cNvSpPr txBox="1"/>
+          <p:nvPr/>
+        </p:nvSpPr>
+        <p:spPr>
+          <a:xfrm>
+            <a:off x="5915025" y="1304779"/>
+            <a:ext cx="912429" cy="369332"/>
+          </a:xfrm>
+          <a:prstGeom prst="rect">
+            <a:avLst/>
+          </a:prstGeom>
+          <a:noFill/>
+        </p:spPr>
+        <p:txBody>
+          <a:bodyPr wrap="none" rtlCol="0">
+            <a:spAutoFit/>
+          </a:bodyPr>
+          <a:lstStyle/>
+          <a:p>
+            <a:r>
+              <a:rPr lang="en-US" altLang="zh-CN" dirty="0"/>
+              <a:t>3 result</a:t>
+            </a:r>
+            <a:endParaRPr lang="zh-CN" altLang="en-US" dirty="0"/>
+          </a:p>
+        </p:txBody>
+      </p:sp>
+      <p:pic>
+        <p:nvPicPr>
+          <p:cNvPr id="14" name="图片 13">
+            <a:extLst>
+              <a:ext uri="{FF2B5EF4-FFF2-40B4-BE49-F238E27FC236}">
+                <a16:creationId xmlns:a16="http://schemas.microsoft.com/office/drawing/2014/main" id="{778E410D-8B5A-E2BE-3EE6-841AD9A319F8}"/>
+              </a:ext>
+            </a:extLst>
+          </p:cNvPr>
+          <p:cNvPicPr>
+            <a:picLocks noChangeAspect="1"/>
+          </p:cNvPicPr>
+          <p:nvPr/>
+        </p:nvPicPr>
+        <p:blipFill>
+          <a:blip r:embed="rId5"/>
+          <a:stretch>
+            <a:fillRect/>
+          </a:stretch>
+        </p:blipFill>
+        <p:spPr>
+          <a:xfrm>
+            <a:off x="5915025" y="1697267"/>
+            <a:ext cx="6276975" cy="257175"/>
+          </a:xfrm>
+          <a:prstGeom prst="rect">
+            <a:avLst/>
+          </a:prstGeom>
+        </p:spPr>
+      </p:pic>
+      <p:pic>
+        <p:nvPicPr>
+          <p:cNvPr id="18" name="图片 17">
+            <a:extLst>
+              <a:ext uri="{FF2B5EF4-FFF2-40B4-BE49-F238E27FC236}">
+                <a16:creationId xmlns:a16="http://schemas.microsoft.com/office/drawing/2014/main" id="{D5A6F833-E317-F903-18CB-6A3DA69921B3}"/>
+              </a:ext>
+            </a:extLst>
+          </p:cNvPr>
+          <p:cNvPicPr>
+            <a:picLocks noChangeAspect="1"/>
+          </p:cNvPicPr>
+          <p:nvPr/>
+        </p:nvPicPr>
+        <p:blipFill>
+          <a:blip r:embed="rId6"/>
+          <a:stretch>
+            <a:fillRect/>
+          </a:stretch>
+        </p:blipFill>
+        <p:spPr>
+          <a:xfrm>
+            <a:off x="7496175" y="1901423"/>
+            <a:ext cx="4695825" cy="1724025"/>
+          </a:xfrm>
+          <a:prstGeom prst="rect">
+            <a:avLst/>
+          </a:prstGeom>
+        </p:spPr>
+      </p:pic>
+    </p:spTree>
+    <p:extLst>
+      <p:ext uri="{BB962C8B-B14F-4D97-AF65-F5344CB8AC3E}">
+        <p14:creationId xmlns:p14="http://schemas.microsoft.com/office/powerpoint/2010/main" val="4005020588"/>
+      </p:ext>
+    </p:extLst>
+  </p:cSld>
+  <p:clrMapOvr>
+    <a:masterClrMapping/>
+  </p:clrMapOvr>
+</p:sld>
+</file>
+
+<file path=ppt/slides/slide6.xml><?xml version="1.0" encoding="utf-8"?>
+<p:sld xmlns:a="http://schemas.openxmlformats.org/drawingml/2006/main" xmlns:r="http://schemas.openxmlformats.org/officeDocument/2006/relationships" xmlns:p="http://schemas.openxmlformats.org/presentationml/2006/main">
+  <p:cSld>
+    <p:spTree>
+      <p:nvGrpSpPr>
+        <p:cNvPr id="1" name=""/>
+        <p:cNvGrpSpPr/>
+        <p:nvPr/>
+      </p:nvGrpSpPr>
+      <p:grpSpPr>
+        <a:xfrm>
+          <a:off x="0" y="0"/>
+          <a:ext cx="0" cy="0"/>
+          <a:chOff x="0" y="0"/>
+          <a:chExt cx="0" cy="0"/>
+        </a:xfrm>
+      </p:grpSpPr>
+      <p:sp>
+        <p:nvSpPr>
+          <p:cNvPr id="2" name="标题 1">
+            <a:extLst>
+              <a:ext uri="{FF2B5EF4-FFF2-40B4-BE49-F238E27FC236}">
+                <a16:creationId xmlns:a16="http://schemas.microsoft.com/office/drawing/2014/main" id="{0E3E392A-AEF4-186A-5606-31E50383A4A8}"/>
+              </a:ext>
+            </a:extLst>
+          </p:cNvPr>
+          <p:cNvSpPr>
+            <a:spLocks noGrp="1"/>
+          </p:cNvSpPr>
+          <p:nvPr>
+            <p:ph type="title"/>
+          </p:nvPr>
+        </p:nvSpPr>
+        <p:spPr/>
+        <p:txBody>
+          <a:bodyPr/>
+          <a:lstStyle/>
+          <a:p>
+            <a:r>
+              <a:rPr lang="en-US" altLang="zh-CN" dirty="0"/>
+              <a:t>Put all generated code in an empty Angular project</a:t>
+            </a:r>
+            <a:endParaRPr lang="zh-CN" altLang="en-US" dirty="0"/>
+          </a:p>
+        </p:txBody>
+      </p:sp>
+      <p:sp>
+        <p:nvSpPr>
+          <p:cNvPr id="3" name="内容占位符 2">
+            <a:extLst>
+              <a:ext uri="{FF2B5EF4-FFF2-40B4-BE49-F238E27FC236}">
+                <a16:creationId xmlns:a16="http://schemas.microsoft.com/office/drawing/2014/main" id="{DE98A188-80E5-3448-CB36-E34FD5D0CEB3}"/>
+              </a:ext>
+            </a:extLst>
+          </p:cNvPr>
+          <p:cNvSpPr>
+            <a:spLocks noGrp="1"/>
+          </p:cNvSpPr>
+          <p:nvPr>
+            <p:ph idx="1"/>
+          </p:nvPr>
+        </p:nvSpPr>
+        <p:spPr/>
+        <p:txBody>
+          <a:bodyPr/>
+          <a:lstStyle/>
+          <a:p>
+            <a:pPr marL="514350" indent="-514350">
+              <a:buFont typeface="+mj-lt"/>
+              <a:buAutoNum type="arabicPeriod"/>
+            </a:pPr>
+            <a:r>
+              <a:rPr lang="en-US" altLang="zh-CN" dirty="0"/>
+              <a:t>Must be a entry file for the Angular project.</a:t>
+            </a:r>
+          </a:p>
+          <a:p>
+            <a:pPr marL="971550" lvl="1" indent="-514350">
+              <a:buFont typeface="+mj-lt"/>
+              <a:buAutoNum type="arabicPeriod"/>
+            </a:pPr>
+            <a:r>
+              <a:rPr lang="en-US" altLang="zh-CN" dirty="0"/>
+              <a:t>App module, app.html, </a:t>
+            </a:r>
+            <a:r>
+              <a:rPr lang="en-US" altLang="zh-CN" dirty="0" err="1"/>
+              <a:t>app.ts</a:t>
+            </a:r>
+            <a:r>
+              <a:rPr lang="en-US" altLang="zh-CN"/>
+              <a:t> and etc.</a:t>
+            </a:r>
+            <a:endParaRPr lang="en-US" altLang="zh-CN" dirty="0"/>
+          </a:p>
+          <a:p>
+            <a:pPr marL="514350" indent="-514350">
+              <a:buFont typeface="+mj-lt"/>
+              <a:buAutoNum type="arabicPeriod"/>
+            </a:pPr>
+            <a:r>
+              <a:rPr lang="en-US" altLang="zh-CN" dirty="0"/>
+              <a:t>First find the absolute path of the generated files.</a:t>
+            </a:r>
+          </a:p>
+          <a:p>
+            <a:pPr marL="514350" indent="-514350">
+              <a:buFont typeface="+mj-lt"/>
+              <a:buAutoNum type="arabicPeriod"/>
+            </a:pPr>
+            <a:r>
+              <a:rPr lang="en-US" altLang="zh-CN" dirty="0"/>
+              <a:t>Copy them and put them in an angular project’s directory </a:t>
+            </a:r>
+            <a:r>
+              <a:rPr lang="en-US" altLang="zh-CN" b="1" dirty="0" err="1"/>
+              <a:t>src</a:t>
+            </a:r>
+            <a:r>
+              <a:rPr lang="en-US" altLang="zh-CN" dirty="0"/>
+              <a:t>.</a:t>
+            </a:r>
+          </a:p>
+          <a:p>
+            <a:pPr marL="514350" indent="-514350">
+              <a:buFont typeface="+mj-lt"/>
+              <a:buAutoNum type="arabicPeriod"/>
+            </a:pPr>
+            <a:r>
+              <a:rPr lang="en-US" altLang="zh-CN" dirty="0"/>
+              <a:t>Run the Angular Project.</a:t>
+            </a:r>
+          </a:p>
+          <a:p>
+            <a:pPr marL="0" indent="0">
+              <a:buNone/>
+            </a:pPr>
+            <a:r>
+              <a:rPr lang="en-US" altLang="zh-CN" dirty="0"/>
+              <a:t>We want to make a directory of the project here</a:t>
+            </a:r>
+          </a:p>
+          <a:p>
+            <a:pPr marL="0" indent="0">
+              <a:buNone/>
+            </a:pPr>
+            <a:endParaRPr lang="zh-CN" altLang="en-US" dirty="0"/>
+          </a:p>
+        </p:txBody>
+      </p:sp>
+    </p:spTree>
+    <p:extLst>
+      <p:ext uri="{BB962C8B-B14F-4D97-AF65-F5344CB8AC3E}">
+        <p14:creationId xmlns:p14="http://schemas.microsoft.com/office/powerpoint/2010/main" val="4240568321"/>
+      </p:ext>
+    </p:extLst>
+  </p:cSld>
+  <p:clrMapOvr>
+    <a:masterClrMapping/>
+  </p:clrMapOvr>
+</p:sld>
+</file>
+
+<file path=ppt/slides/slide7.xml><?xml version="1.0" encoding="utf-8"?>
+<p:sld xmlns:a="http://schemas.openxmlformats.org/drawingml/2006/main" xmlns:r="http://schemas.openxmlformats.org/officeDocument/2006/relationships" xmlns:p="http://schemas.openxmlformats.org/presentationml/2006/main">
+  <p:cSld>
+    <p:spTree>
+      <p:nvGrpSpPr>
+        <p:cNvPr id="1" name=""/>
+        <p:cNvGrpSpPr/>
+        <p:nvPr/>
+      </p:nvGrpSpPr>
+      <p:grpSpPr>
+        <a:xfrm>
+          <a:off x="0" y="0"/>
+          <a:ext cx="0" cy="0"/>
+          <a:chOff x="0" y="0"/>
+          <a:chExt cx="0" cy="0"/>
+        </a:xfrm>
+      </p:grpSpPr>
+      <p:sp>
+        <p:nvSpPr>
+          <p:cNvPr id="2" name="标题 1">
+            <a:extLst>
+              <a:ext uri="{FF2B5EF4-FFF2-40B4-BE49-F238E27FC236}">
+                <a16:creationId xmlns:a16="http://schemas.microsoft.com/office/drawing/2014/main" id="{448B8817-4E1D-924D-A3DE-3C2E9A8C0EB1}"/>
+              </a:ext>
+            </a:extLst>
+          </p:cNvPr>
+          <p:cNvSpPr>
+            <a:spLocks noGrp="1"/>
+          </p:cNvSpPr>
+          <p:nvPr>
+            <p:ph type="title"/>
+          </p:nvPr>
+        </p:nvSpPr>
+        <p:spPr/>
+        <p:txBody>
+          <a:bodyPr/>
+          <a:lstStyle/>
+          <a:p>
+            <a:r>
+              <a:rPr lang="en-US" altLang="zh-CN" dirty="0"/>
+              <a:t>Where we save our project angular?</a:t>
+            </a:r>
+            <a:endParaRPr lang="zh-CN" altLang="en-US" dirty="0"/>
+          </a:p>
+        </p:txBody>
+      </p:sp>
+      <p:sp>
+        <p:nvSpPr>
+          <p:cNvPr id="3" name="内容占位符 2">
+            <a:extLst>
+              <a:ext uri="{FF2B5EF4-FFF2-40B4-BE49-F238E27FC236}">
+                <a16:creationId xmlns:a16="http://schemas.microsoft.com/office/drawing/2014/main" id="{986A44E1-B18C-DFFB-CAA7-6BF40E79BF9D}"/>
+              </a:ext>
+            </a:extLst>
+          </p:cNvPr>
+          <p:cNvSpPr>
+            <a:spLocks noGrp="1"/>
+          </p:cNvSpPr>
+          <p:nvPr>
+            <p:ph idx="1"/>
+          </p:nvPr>
+        </p:nvSpPr>
+        <p:spPr/>
+        <p:txBody>
+          <a:bodyPr/>
+          <a:lstStyle/>
+          <a:p>
+            <a:r>
+              <a:rPr lang="en-US" altLang="zh-CN" dirty="0"/>
+              <a:t>We want to make a directory of the project here</a:t>
+            </a:r>
+          </a:p>
+          <a:p>
+            <a:endParaRPr lang="zh-CN" altLang="en-US" dirty="0"/>
+          </a:p>
+        </p:txBody>
+      </p:sp>
+      <p:pic>
+        <p:nvPicPr>
+          <p:cNvPr id="4" name="图片 3">
+            <a:extLst>
+              <a:ext uri="{FF2B5EF4-FFF2-40B4-BE49-F238E27FC236}">
+                <a16:creationId xmlns:a16="http://schemas.microsoft.com/office/drawing/2014/main" id="{CC7F3A9E-FC66-E0EC-1939-D689EC576645}"/>
+              </a:ext>
+            </a:extLst>
+          </p:cNvPr>
+          <p:cNvPicPr>
+            <a:picLocks noChangeAspect="1"/>
+          </p:cNvPicPr>
+          <p:nvPr/>
+        </p:nvPicPr>
+        <p:blipFill>
+          <a:blip r:embed="rId2"/>
+          <a:stretch>
+            <a:fillRect/>
+          </a:stretch>
+        </p:blipFill>
+        <p:spPr>
+          <a:xfrm>
+            <a:off x="1234994" y="2500143"/>
+            <a:ext cx="4861006" cy="3996144"/>
+          </a:xfrm>
+          <a:prstGeom prst="rect">
+            <a:avLst/>
+          </a:prstGeom>
+        </p:spPr>
+      </p:pic>
+    </p:spTree>
+    <p:extLst>
+      <p:ext uri="{BB962C8B-B14F-4D97-AF65-F5344CB8AC3E}">
+        <p14:creationId xmlns:p14="http://schemas.microsoft.com/office/powerpoint/2010/main" val="1696781703"/>
+      </p:ext>
+    </p:extLst>
+  </p:cSld>
+  <p:clrMapOvr>
+    <a:masterClrMapping/>
+  </p:clrMapOvr>
+</p:sld>
+</file>
+
+<file path=ppt/slides/slide8.xml><?xml version="1.0" encoding="utf-8"?>
+<p:sld xmlns:a="http://schemas.openxmlformats.org/drawingml/2006/main" xmlns:r="http://schemas.openxmlformats.org/officeDocument/2006/relationships" xmlns:p="http://schemas.openxmlformats.org/presentationml/2006/main">
+  <p:cSld>
+    <p:spTree>
+      <p:nvGrpSpPr>
+        <p:cNvPr id="1" name=""/>
+        <p:cNvGrpSpPr/>
+        <p:nvPr/>
+      </p:nvGrpSpPr>
+      <p:grpSpPr>
+        <a:xfrm>
+          <a:off x="0" y="0"/>
+          <a:ext cx="0" cy="0"/>
+          <a:chOff x="0" y="0"/>
+          <a:chExt cx="0" cy="0"/>
+        </a:xfrm>
+      </p:grpSpPr>
+      <p:sp>
+        <p:nvSpPr>
+          <p:cNvPr id="2" name="标题 1">
+            <a:extLst>
+              <a:ext uri="{FF2B5EF4-FFF2-40B4-BE49-F238E27FC236}">
+                <a16:creationId xmlns:a16="http://schemas.microsoft.com/office/drawing/2014/main" id="{02F8245F-90C2-D975-8210-16F20925BE6F}"/>
+              </a:ext>
+            </a:extLst>
+          </p:cNvPr>
+          <p:cNvSpPr>
+            <a:spLocks noGrp="1"/>
+          </p:cNvSpPr>
+          <p:nvPr>
+            <p:ph type="title"/>
+          </p:nvPr>
+        </p:nvSpPr>
+        <p:spPr/>
+        <p:txBody>
+          <a:bodyPr/>
+          <a:lstStyle/>
+          <a:p>
+            <a:r>
+              <a:rPr lang="en-US" altLang="zh-CN" dirty="0"/>
+              <a:t>Where we save our project angular?</a:t>
+            </a:r>
+            <a:endParaRPr lang="zh-CN" altLang="en-US" dirty="0"/>
+          </a:p>
+        </p:txBody>
+      </p:sp>
+      <p:sp>
+        <p:nvSpPr>
+          <p:cNvPr id="3" name="内容占位符 2">
+            <a:extLst>
+              <a:ext uri="{FF2B5EF4-FFF2-40B4-BE49-F238E27FC236}">
+                <a16:creationId xmlns:a16="http://schemas.microsoft.com/office/drawing/2014/main" id="{C9BDF520-40FF-B4FE-F550-288494513D6C}"/>
+              </a:ext>
+            </a:extLst>
+          </p:cNvPr>
+          <p:cNvSpPr>
+            <a:spLocks noGrp="1"/>
+          </p:cNvSpPr>
+          <p:nvPr>
+            <p:ph idx="1"/>
+          </p:nvPr>
+        </p:nvSpPr>
+        <p:spPr/>
+        <p:txBody>
+          <a:bodyPr/>
+          <a:lstStyle/>
+          <a:p>
+            <a:r>
+              <a:rPr lang="en-US" altLang="zh-CN" dirty="0"/>
+              <a:t>When put the generated files in the angular project we need to think the how</a:t>
+            </a:r>
+          </a:p>
+          <a:p>
+            <a:pPr lvl="1"/>
+            <a:r>
+              <a:rPr lang="en-US" altLang="zh-CN" dirty="0"/>
+              <a:t>1. The angular project is generated once</a:t>
+            </a:r>
+          </a:p>
+          <a:p>
+            <a:pPr lvl="1"/>
+            <a:r>
+              <a:rPr lang="en-US" altLang="zh-CN" dirty="0"/>
+              <a:t>2. When the instance is changed the angular project only updates the corresponding generated files. </a:t>
+            </a:r>
+          </a:p>
+          <a:p>
+            <a:pPr lvl="2"/>
+            <a:r>
+              <a:rPr lang="en-US" altLang="zh-CN" dirty="0"/>
+              <a:t>Remove the old files.</a:t>
+            </a:r>
+          </a:p>
+          <a:p>
+            <a:pPr lvl="2"/>
+            <a:r>
+              <a:rPr lang="en-US" altLang="zh-CN" dirty="0"/>
+              <a:t>Put new generated files in </a:t>
+            </a:r>
+          </a:p>
+          <a:p>
+            <a:pPr lvl="1"/>
+            <a:r>
+              <a:rPr lang="en-US" altLang="zh-CN" dirty="0"/>
+              <a:t>3. The angular project hot-runs;</a:t>
+            </a:r>
+          </a:p>
+        </p:txBody>
+      </p:sp>
+    </p:spTree>
+    <p:extLst>
+      <p:ext uri="{BB962C8B-B14F-4D97-AF65-F5344CB8AC3E}">
+        <p14:creationId xmlns:p14="http://schemas.microsoft.com/office/powerpoint/2010/main" val="3697302589"/>
+      </p:ext>
+    </p:extLst>
+  </p:cSld>
+  <p:clrMapOvr>
+    <a:masterClrMapping/>
+  </p:clrMapOvr>
+</p:sld>
+</file>
+
 <file path=ppt/theme/theme1.xml><?xml version="1.0" encoding="utf-8"?>
 <a:theme xmlns:a="http://schemas.openxmlformats.org/drawingml/2006/main" name="Office 主题​​">
   <a:themeElements>

</xml_diff>

<commit_message>
Generation of the code - phrase 1
</commit_message>
<xml_diff>
--- a/planning-and-logs/Xtext&Xtend.pptx
+++ b/planning-and-logs/Xtext&Xtend.pptx
@@ -4663,8 +4663,22 @@
               <a:t>app.ts</a:t>
             </a:r>
             <a:r>
+              <a:rPr lang="en-US" altLang="zh-CN" dirty="0"/>
+              <a:t> and etc.</a:t>
+            </a:r>
+          </a:p>
+          <a:p>
+            <a:pPr marL="971550" lvl="1" indent="-514350">
+              <a:buFont typeface="+mj-lt"/>
+              <a:buAutoNum type="arabicPeriod"/>
+            </a:pPr>
+            <a:r>
+              <a:rPr lang="en-US" altLang="zh-CN" dirty="0"/>
+              <a:t>Declare all the components in </a:t>
+            </a:r>
+            <a:r>
               <a:rPr lang="en-US" altLang="zh-CN"/>
-              <a:t> and etc.</a:t>
+              <a:t>one module.</a:t>
             </a:r>
             <a:endParaRPr lang="en-US" altLang="zh-CN" dirty="0"/>
           </a:p>
@@ -4932,7 +4946,7 @@
             <a:pPr lvl="1"/>
             <a:r>
               <a:rPr lang="en-US" altLang="zh-CN" dirty="0"/>
-              <a:t>1. The angular project is generated once</a:t>
+              <a:t>1. The angular project is generated only once</a:t>
             </a:r>
           </a:p>
           <a:p>

</xml_diff>

<commit_message>
[Feature] Run generated Angular project. - V1.0.1
This is the first milestone for the modeling from simple text to a runnable Angular project.
</commit_message>
<xml_diff>
--- a/planning-and-logs/Xtext&Xtend.pptx
+++ b/planning-and-logs/Xtext&Xtend.pptx
@@ -13,6 +13,9 @@
     <p:sldId id="261" r:id="rId7"/>
     <p:sldId id="262" r:id="rId8"/>
     <p:sldId id="263" r:id="rId9"/>
+    <p:sldId id="265" r:id="rId10"/>
+    <p:sldId id="266" r:id="rId11"/>
+    <p:sldId id="264" r:id="rId12"/>
   </p:sldIdLst>
   <p:sldSz cx="12192000" cy="6858000"/>
   <p:notesSz cx="6858000" cy="9144000"/>
@@ -134,6 +137,17 @@
             <p14:sldId id="263"/>
           </p14:sldIdLst>
         </p14:section>
+        <p14:section name="Angular-Ficheros Obligatorios" id="{1729EFFB-06C4-4DD8-97E9-E77AFC0EEE7B}">
+          <p14:sldIdLst>
+            <p14:sldId id="265"/>
+            <p14:sldId id="266"/>
+          </p14:sldIdLst>
+        </p14:section>
+        <p14:section name="Xtend - clases" id="{51471BB4-B304-49B2-8D10-61A8AFC8BBDA}">
+          <p14:sldIdLst>
+            <p14:sldId id="264"/>
+          </p14:sldIdLst>
+        </p14:section>
       </p14:sectionLst>
     </p:ext>
     <p:ext uri="{EFAFB233-063F-42B5-8137-9DF3F51BA10A}">
@@ -290,7 +304,7 @@
           <a:p>
             <a:fld id="{298D810B-F3C2-4B26-A7B0-5F7F8CF6EAE6}" type="datetimeFigureOut">
               <a:rPr lang="zh-CN" altLang="en-US" smtClean="0"/>
-              <a:t>2023/4/11</a:t>
+              <a:t>2023/4/20</a:t>
             </a:fld>
             <a:endParaRPr lang="zh-CN" altLang="en-US"/>
           </a:p>
@@ -488,7 +502,7 @@
           <a:p>
             <a:fld id="{298D810B-F3C2-4B26-A7B0-5F7F8CF6EAE6}" type="datetimeFigureOut">
               <a:rPr lang="zh-CN" altLang="en-US" smtClean="0"/>
-              <a:t>2023/4/11</a:t>
+              <a:t>2023/4/20</a:t>
             </a:fld>
             <a:endParaRPr lang="zh-CN" altLang="en-US"/>
           </a:p>
@@ -696,7 +710,7 @@
           <a:p>
             <a:fld id="{298D810B-F3C2-4B26-A7B0-5F7F8CF6EAE6}" type="datetimeFigureOut">
               <a:rPr lang="zh-CN" altLang="en-US" smtClean="0"/>
-              <a:t>2023/4/11</a:t>
+              <a:t>2023/4/20</a:t>
             </a:fld>
             <a:endParaRPr lang="zh-CN" altLang="en-US"/>
           </a:p>
@@ -894,7 +908,7 @@
           <a:p>
             <a:fld id="{298D810B-F3C2-4B26-A7B0-5F7F8CF6EAE6}" type="datetimeFigureOut">
               <a:rPr lang="zh-CN" altLang="en-US" smtClean="0"/>
-              <a:t>2023/4/11</a:t>
+              <a:t>2023/4/20</a:t>
             </a:fld>
             <a:endParaRPr lang="zh-CN" altLang="en-US"/>
           </a:p>
@@ -1169,7 +1183,7 @@
           <a:p>
             <a:fld id="{298D810B-F3C2-4B26-A7B0-5F7F8CF6EAE6}" type="datetimeFigureOut">
               <a:rPr lang="zh-CN" altLang="en-US" smtClean="0"/>
-              <a:t>2023/4/11</a:t>
+              <a:t>2023/4/20</a:t>
             </a:fld>
             <a:endParaRPr lang="zh-CN" altLang="en-US"/>
           </a:p>
@@ -1434,7 +1448,7 @@
           <a:p>
             <a:fld id="{298D810B-F3C2-4B26-A7B0-5F7F8CF6EAE6}" type="datetimeFigureOut">
               <a:rPr lang="zh-CN" altLang="en-US" smtClean="0"/>
-              <a:t>2023/4/11</a:t>
+              <a:t>2023/4/20</a:t>
             </a:fld>
             <a:endParaRPr lang="zh-CN" altLang="en-US"/>
           </a:p>
@@ -1846,7 +1860,7 @@
           <a:p>
             <a:fld id="{298D810B-F3C2-4B26-A7B0-5F7F8CF6EAE6}" type="datetimeFigureOut">
               <a:rPr lang="zh-CN" altLang="en-US" smtClean="0"/>
-              <a:t>2023/4/11</a:t>
+              <a:t>2023/4/20</a:t>
             </a:fld>
             <a:endParaRPr lang="zh-CN" altLang="en-US"/>
           </a:p>
@@ -1987,7 +2001,7 @@
           <a:p>
             <a:fld id="{298D810B-F3C2-4B26-A7B0-5F7F8CF6EAE6}" type="datetimeFigureOut">
               <a:rPr lang="zh-CN" altLang="en-US" smtClean="0"/>
-              <a:t>2023/4/11</a:t>
+              <a:t>2023/4/20</a:t>
             </a:fld>
             <a:endParaRPr lang="zh-CN" altLang="en-US"/>
           </a:p>
@@ -2100,7 +2114,7 @@
           <a:p>
             <a:fld id="{298D810B-F3C2-4B26-A7B0-5F7F8CF6EAE6}" type="datetimeFigureOut">
               <a:rPr lang="zh-CN" altLang="en-US" smtClean="0"/>
-              <a:t>2023/4/11</a:t>
+              <a:t>2023/4/20</a:t>
             </a:fld>
             <a:endParaRPr lang="zh-CN" altLang="en-US"/>
           </a:p>
@@ -2411,7 +2425,7 @@
           <a:p>
             <a:fld id="{298D810B-F3C2-4B26-A7B0-5F7F8CF6EAE6}" type="datetimeFigureOut">
               <a:rPr lang="zh-CN" altLang="en-US" smtClean="0"/>
-              <a:t>2023/4/11</a:t>
+              <a:t>2023/4/20</a:t>
             </a:fld>
             <a:endParaRPr lang="zh-CN" altLang="en-US"/>
           </a:p>
@@ -2699,7 +2713,7 @@
           <a:p>
             <a:fld id="{298D810B-F3C2-4B26-A7B0-5F7F8CF6EAE6}" type="datetimeFigureOut">
               <a:rPr lang="zh-CN" altLang="en-US" smtClean="0"/>
-              <a:t>2023/4/11</a:t>
+              <a:t>2023/4/20</a:t>
             </a:fld>
             <a:endParaRPr lang="zh-CN" altLang="en-US"/>
           </a:p>
@@ -2940,7 +2954,7 @@
           <a:p>
             <a:fld id="{298D810B-F3C2-4B26-A7B0-5F7F8CF6EAE6}" type="datetimeFigureOut">
               <a:rPr lang="zh-CN" altLang="en-US" smtClean="0"/>
-              <a:t>2023/4/11</a:t>
+              <a:t>2023/4/20</a:t>
             </a:fld>
             <a:endParaRPr lang="zh-CN" altLang="en-US"/>
           </a:p>
@@ -3449,6 +3463,204 @@
 </p:sld>
 </file>
 
+<file path=ppt/slides/slide10.xml><?xml version="1.0" encoding="utf-8"?>
+<p:sld xmlns:a="http://schemas.openxmlformats.org/drawingml/2006/main" xmlns:r="http://schemas.openxmlformats.org/officeDocument/2006/relationships" xmlns:p="http://schemas.openxmlformats.org/presentationml/2006/main">
+  <p:cSld>
+    <p:spTree>
+      <p:nvGrpSpPr>
+        <p:cNvPr id="1" name=""/>
+        <p:cNvGrpSpPr/>
+        <p:nvPr/>
+      </p:nvGrpSpPr>
+      <p:grpSpPr>
+        <a:xfrm>
+          <a:off x="0" y="0"/>
+          <a:ext cx="0" cy="0"/>
+          <a:chOff x="0" y="0"/>
+          <a:chExt cx="0" cy="0"/>
+        </a:xfrm>
+      </p:grpSpPr>
+      <p:sp>
+        <p:nvSpPr>
+          <p:cNvPr id="2" name="标题 1">
+            <a:extLst>
+              <a:ext uri="{FF2B5EF4-FFF2-40B4-BE49-F238E27FC236}">
+                <a16:creationId xmlns:a16="http://schemas.microsoft.com/office/drawing/2014/main" id="{47F6AE7A-6C8F-4B36-9BBF-9F0E25671C89}"/>
+              </a:ext>
+            </a:extLst>
+          </p:cNvPr>
+          <p:cNvSpPr>
+            <a:spLocks noGrp="1"/>
+          </p:cNvSpPr>
+          <p:nvPr>
+            <p:ph type="title"/>
+          </p:nvPr>
+        </p:nvSpPr>
+        <p:spPr/>
+        <p:txBody>
+          <a:bodyPr/>
+          <a:lstStyle/>
+          <a:p>
+            <a:r>
+              <a:rPr lang="en-US" altLang="zh-CN" dirty="0"/>
+              <a:t>Angular Router – para las </a:t>
+            </a:r>
+            <a:r>
+              <a:rPr lang="en-US" altLang="zh-CN" dirty="0" err="1"/>
+              <a:t>transiciones</a:t>
+            </a:r>
+            <a:r>
+              <a:rPr lang="en-US" altLang="zh-CN" dirty="0"/>
+              <a:t> entre pages</a:t>
+            </a:r>
+            <a:endParaRPr lang="zh-CN" altLang="en-US" dirty="0"/>
+          </a:p>
+        </p:txBody>
+      </p:sp>
+      <p:sp>
+        <p:nvSpPr>
+          <p:cNvPr id="3" name="内容占位符 2">
+            <a:extLst>
+              <a:ext uri="{FF2B5EF4-FFF2-40B4-BE49-F238E27FC236}">
+                <a16:creationId xmlns:a16="http://schemas.microsoft.com/office/drawing/2014/main" id="{7961F6E2-5D96-B0D2-E11A-1AF817596C8D}"/>
+              </a:ext>
+            </a:extLst>
+          </p:cNvPr>
+          <p:cNvSpPr>
+            <a:spLocks noGrp="1"/>
+          </p:cNvSpPr>
+          <p:nvPr>
+            <p:ph idx="1"/>
+          </p:nvPr>
+        </p:nvSpPr>
+        <p:spPr/>
+        <p:txBody>
+          <a:bodyPr/>
+          <a:lstStyle/>
+          <a:p>
+            <a:endParaRPr lang="zh-CN" altLang="en-US" dirty="0"/>
+          </a:p>
+        </p:txBody>
+      </p:sp>
+    </p:spTree>
+    <p:extLst>
+      <p:ext uri="{BB962C8B-B14F-4D97-AF65-F5344CB8AC3E}">
+        <p14:creationId xmlns:p14="http://schemas.microsoft.com/office/powerpoint/2010/main" val="3815008100"/>
+      </p:ext>
+    </p:extLst>
+  </p:cSld>
+  <p:clrMapOvr>
+    <a:masterClrMapping/>
+  </p:clrMapOvr>
+</p:sld>
+</file>
+
+<file path=ppt/slides/slide11.xml><?xml version="1.0" encoding="utf-8"?>
+<p:sld xmlns:a="http://schemas.openxmlformats.org/drawingml/2006/main" xmlns:r="http://schemas.openxmlformats.org/officeDocument/2006/relationships" xmlns:p="http://schemas.openxmlformats.org/presentationml/2006/main">
+  <p:cSld>
+    <p:spTree>
+      <p:nvGrpSpPr>
+        <p:cNvPr id="1" name=""/>
+        <p:cNvGrpSpPr/>
+        <p:nvPr/>
+      </p:nvGrpSpPr>
+      <p:grpSpPr>
+        <a:xfrm>
+          <a:off x="0" y="0"/>
+          <a:ext cx="0" cy="0"/>
+          <a:chOff x="0" y="0"/>
+          <a:chExt cx="0" cy="0"/>
+        </a:xfrm>
+      </p:grpSpPr>
+      <p:sp>
+        <p:nvSpPr>
+          <p:cNvPr id="2" name="标题 1">
+            <a:extLst>
+              <a:ext uri="{FF2B5EF4-FFF2-40B4-BE49-F238E27FC236}">
+                <a16:creationId xmlns:a16="http://schemas.microsoft.com/office/drawing/2014/main" id="{2A787E8C-CD8B-0E57-9D30-0A268A996197}"/>
+              </a:ext>
+            </a:extLst>
+          </p:cNvPr>
+          <p:cNvSpPr>
+            <a:spLocks noGrp="1"/>
+          </p:cNvSpPr>
+          <p:nvPr>
+            <p:ph type="title"/>
+          </p:nvPr>
+        </p:nvSpPr>
+        <p:spPr/>
+        <p:txBody>
+          <a:bodyPr/>
+          <a:lstStyle/>
+          <a:p>
+            <a:r>
+              <a:rPr lang="en-US" altLang="zh-CN"/>
+              <a:t>Clases</a:t>
+            </a:r>
+            <a:endParaRPr lang="zh-CN" altLang="en-US"/>
+          </a:p>
+        </p:txBody>
+      </p:sp>
+      <p:sp>
+        <p:nvSpPr>
+          <p:cNvPr id="3" name="内容占位符 2">
+            <a:extLst>
+              <a:ext uri="{FF2B5EF4-FFF2-40B4-BE49-F238E27FC236}">
+                <a16:creationId xmlns:a16="http://schemas.microsoft.com/office/drawing/2014/main" id="{B1E64344-86FD-3B56-5B8F-AA67F00A36DA}"/>
+              </a:ext>
+            </a:extLst>
+          </p:cNvPr>
+          <p:cNvSpPr>
+            <a:spLocks noGrp="1"/>
+          </p:cNvSpPr>
+          <p:nvPr>
+            <p:ph idx="1"/>
+          </p:nvPr>
+        </p:nvSpPr>
+        <p:spPr/>
+        <p:txBody>
+          <a:bodyPr/>
+          <a:lstStyle/>
+          <a:p>
+            <a:r>
+              <a:rPr lang="en-US" altLang="zh-CN" dirty="0"/>
+              <a:t>Ref:</a:t>
+            </a:r>
+          </a:p>
+          <a:p>
+            <a:pPr lvl="1"/>
+            <a:r>
+              <a:rPr lang="en-US" altLang="zh-CN" dirty="0" err="1">
+                <a:hlinkClick r:id="rId2"/>
+              </a:rPr>
+              <a:t>Xtend</a:t>
+            </a:r>
+            <a:r>
+              <a:rPr lang="en-US" altLang="zh-CN" dirty="0">
+                <a:hlinkClick r:id="rId2"/>
+              </a:rPr>
+              <a:t> - Classes and Members (eclipse.org)</a:t>
+            </a:r>
+            <a:endParaRPr lang="en-US" altLang="zh-CN" dirty="0"/>
+          </a:p>
+          <a:p>
+            <a:endParaRPr lang="zh-CN" altLang="en-US" dirty="0"/>
+          </a:p>
+        </p:txBody>
+      </p:sp>
+    </p:spTree>
+    <p:extLst>
+      <p:ext uri="{BB962C8B-B14F-4D97-AF65-F5344CB8AC3E}">
+        <p14:creationId xmlns:p14="http://schemas.microsoft.com/office/powerpoint/2010/main" val="3175450437"/>
+      </p:ext>
+    </p:extLst>
+  </p:cSld>
+  <p:clrMapOvr>
+    <a:masterClrMapping/>
+  </p:clrMapOvr>
+</p:sld>
+</file>
+
 <file path=ppt/slides/slide2.xml><?xml version="1.0" encoding="utf-8"?>
 <p:sld xmlns:a="http://schemas.openxmlformats.org/drawingml/2006/main" xmlns:r="http://schemas.openxmlformats.org/officeDocument/2006/relationships" xmlns:p="http://schemas.openxmlformats.org/presentationml/2006/main">
   <p:cSld>
@@ -4983,6 +5195,196 @@
     <p:extLst>
       <p:ext uri="{BB962C8B-B14F-4D97-AF65-F5344CB8AC3E}">
         <p14:creationId xmlns:p14="http://schemas.microsoft.com/office/powerpoint/2010/main" val="3697302589"/>
+      </p:ext>
+    </p:extLst>
+  </p:cSld>
+  <p:clrMapOvr>
+    <a:masterClrMapping/>
+  </p:clrMapOvr>
+</p:sld>
+</file>
+
+<file path=ppt/slides/slide9.xml><?xml version="1.0" encoding="utf-8"?>
+<p:sld xmlns:a="http://schemas.openxmlformats.org/drawingml/2006/main" xmlns:r="http://schemas.openxmlformats.org/officeDocument/2006/relationships" xmlns:p="http://schemas.openxmlformats.org/presentationml/2006/main">
+  <p:cSld>
+    <p:spTree>
+      <p:nvGrpSpPr>
+        <p:cNvPr id="1" name=""/>
+        <p:cNvGrpSpPr/>
+        <p:nvPr/>
+      </p:nvGrpSpPr>
+      <p:grpSpPr>
+        <a:xfrm>
+          <a:off x="0" y="0"/>
+          <a:ext cx="0" cy="0"/>
+          <a:chOff x="0" y="0"/>
+          <a:chExt cx="0" cy="0"/>
+        </a:xfrm>
+      </p:grpSpPr>
+      <p:sp>
+        <p:nvSpPr>
+          <p:cNvPr id="2" name="标题 1">
+            <a:extLst>
+              <a:ext uri="{FF2B5EF4-FFF2-40B4-BE49-F238E27FC236}">
+                <a16:creationId xmlns:a16="http://schemas.microsoft.com/office/drawing/2014/main" id="{F2FE2660-7AF6-B1A7-138B-EFD590205291}"/>
+              </a:ext>
+            </a:extLst>
+          </p:cNvPr>
+          <p:cNvSpPr>
+            <a:spLocks noGrp="1"/>
+          </p:cNvSpPr>
+          <p:nvPr>
+            <p:ph type="title"/>
+          </p:nvPr>
+        </p:nvSpPr>
+        <p:spPr/>
+        <p:txBody>
+          <a:bodyPr/>
+          <a:lstStyle/>
+          <a:p>
+            <a:r>
+              <a:rPr lang="es-ES" altLang="zh-CN" dirty="0"/>
+              <a:t>Los elementos obligatorios para ejecución de Angular. – La </a:t>
+            </a:r>
+            <a:r>
+              <a:rPr lang="es-ES" altLang="zh-CN" b="1" dirty="0"/>
+              <a:t>entrada</a:t>
+            </a:r>
+            <a:r>
+              <a:rPr lang="es-ES" altLang="zh-CN" dirty="0"/>
+              <a:t> de la </a:t>
+            </a:r>
+            <a:r>
+              <a:rPr lang="es-ES" altLang="zh-CN" b="1" dirty="0"/>
+              <a:t>APP</a:t>
+            </a:r>
+            <a:endParaRPr lang="zh-CN" altLang="en-US" b="1" dirty="0"/>
+          </a:p>
+        </p:txBody>
+      </p:sp>
+      <p:pic>
+        <p:nvPicPr>
+          <p:cNvPr id="5" name="内容占位符 4">
+            <a:extLst>
+              <a:ext uri="{FF2B5EF4-FFF2-40B4-BE49-F238E27FC236}">
+                <a16:creationId xmlns:a16="http://schemas.microsoft.com/office/drawing/2014/main" id="{F2BC40D6-749D-B4B9-68B1-15E509B7DE27}"/>
+              </a:ext>
+            </a:extLst>
+          </p:cNvPr>
+          <p:cNvPicPr>
+            <a:picLocks noGrp="1" noChangeAspect="1"/>
+          </p:cNvPicPr>
+          <p:nvPr>
+            <p:ph idx="1"/>
+          </p:nvPr>
+        </p:nvPicPr>
+        <p:blipFill>
+          <a:blip r:embed="rId2"/>
+          <a:stretch>
+            <a:fillRect/>
+          </a:stretch>
+        </p:blipFill>
+        <p:spPr>
+          <a:xfrm>
+            <a:off x="496231" y="2023588"/>
+            <a:ext cx="2526877" cy="4351338"/>
+          </a:xfrm>
+        </p:spPr>
+      </p:pic>
+      <p:pic>
+        <p:nvPicPr>
+          <p:cNvPr id="7" name="图片 6">
+            <a:extLst>
+              <a:ext uri="{FF2B5EF4-FFF2-40B4-BE49-F238E27FC236}">
+                <a16:creationId xmlns:a16="http://schemas.microsoft.com/office/drawing/2014/main" id="{7FF66092-00B9-7EEC-A64D-BA67C526FA08}"/>
+              </a:ext>
+            </a:extLst>
+          </p:cNvPr>
+          <p:cNvPicPr>
+            <a:picLocks noChangeAspect="1"/>
+          </p:cNvPicPr>
+          <p:nvPr/>
+        </p:nvPicPr>
+        <p:blipFill>
+          <a:blip r:embed="rId3"/>
+          <a:stretch>
+            <a:fillRect/>
+          </a:stretch>
+        </p:blipFill>
+        <p:spPr>
+          <a:xfrm>
+            <a:off x="3244736" y="2023588"/>
+            <a:ext cx="2981325" cy="3648075"/>
+          </a:xfrm>
+          <a:prstGeom prst="rect">
+            <a:avLst/>
+          </a:prstGeom>
+        </p:spPr>
+      </p:pic>
+      <p:pic>
+        <p:nvPicPr>
+          <p:cNvPr id="13" name="图片 12">
+            <a:extLst>
+              <a:ext uri="{FF2B5EF4-FFF2-40B4-BE49-F238E27FC236}">
+                <a16:creationId xmlns:a16="http://schemas.microsoft.com/office/drawing/2014/main" id="{691F3102-0BDE-96E3-0545-AB340728CEA1}"/>
+              </a:ext>
+            </a:extLst>
+          </p:cNvPr>
+          <p:cNvPicPr>
+            <a:picLocks noChangeAspect="1"/>
+          </p:cNvPicPr>
+          <p:nvPr/>
+        </p:nvPicPr>
+        <p:blipFill>
+          <a:blip r:embed="rId4"/>
+          <a:stretch>
+            <a:fillRect/>
+          </a:stretch>
+        </p:blipFill>
+        <p:spPr>
+          <a:xfrm>
+            <a:off x="9192116" y="2023588"/>
+            <a:ext cx="2838450" cy="3228975"/>
+          </a:xfrm>
+          <a:prstGeom prst="rect">
+            <a:avLst/>
+          </a:prstGeom>
+        </p:spPr>
+      </p:pic>
+      <p:pic>
+        <p:nvPicPr>
+          <p:cNvPr id="15" name="图片 14">
+            <a:extLst>
+              <a:ext uri="{FF2B5EF4-FFF2-40B4-BE49-F238E27FC236}">
+                <a16:creationId xmlns:a16="http://schemas.microsoft.com/office/drawing/2014/main" id="{1E78F6D4-E75A-E374-530E-A87871479AB4}"/>
+              </a:ext>
+            </a:extLst>
+          </p:cNvPr>
+          <p:cNvPicPr>
+            <a:picLocks noChangeAspect="1"/>
+          </p:cNvPicPr>
+          <p:nvPr/>
+        </p:nvPicPr>
+        <p:blipFill>
+          <a:blip r:embed="rId5"/>
+          <a:stretch>
+            <a:fillRect/>
+          </a:stretch>
+        </p:blipFill>
+        <p:spPr>
+          <a:xfrm>
+            <a:off x="6389876" y="2023588"/>
+            <a:ext cx="2638425" cy="4238625"/>
+          </a:xfrm>
+          <a:prstGeom prst="rect">
+            <a:avLst/>
+          </a:prstGeom>
+        </p:spPr>
+      </p:pic>
+    </p:spTree>
+    <p:extLst>
+      <p:ext uri="{BB962C8B-B14F-4D97-AF65-F5344CB8AC3E}">
+        <p14:creationId xmlns:p14="http://schemas.microsoft.com/office/powerpoint/2010/main" val="2578845196"/>
       </p:ext>
     </p:extLst>
   </p:cSld>

</xml_diff>